<commit_message>
Modified David's PowerPoint slices
</commit_message>
<xml_diff>
--- a/Crime_Comparisons_and_Trends.pptx
+++ b/Crime_Comparisons_and_Trends.pptx
@@ -246,7 +246,7 @@
           <a:p>
             <a:fld id="{B8A70668-5887-4AA1-B337-5A12CCB65D61}" type="datetimeFigureOut">
               <a:rPr lang="en-US" smtClean="0"/>
-              <a:t>9/2/2019</a:t>
+              <a:t>9/3/2019</a:t>
             </a:fld>
             <a:endParaRPr lang="en-US"/>
           </a:p>
@@ -416,7 +416,7 @@
           <a:p>
             <a:fld id="{B8A70668-5887-4AA1-B337-5A12CCB65D61}" type="datetimeFigureOut">
               <a:rPr lang="en-US" smtClean="0"/>
-              <a:t>9/2/2019</a:t>
+              <a:t>9/3/2019</a:t>
             </a:fld>
             <a:endParaRPr lang="en-US"/>
           </a:p>
@@ -596,7 +596,7 @@
           <a:p>
             <a:fld id="{B8A70668-5887-4AA1-B337-5A12CCB65D61}" type="datetimeFigureOut">
               <a:rPr lang="en-US" smtClean="0"/>
-              <a:t>9/2/2019</a:t>
+              <a:t>9/3/2019</a:t>
             </a:fld>
             <a:endParaRPr lang="en-US"/>
           </a:p>
@@ -766,7 +766,7 @@
           <a:p>
             <a:fld id="{B8A70668-5887-4AA1-B337-5A12CCB65D61}" type="datetimeFigureOut">
               <a:rPr lang="en-US" smtClean="0"/>
-              <a:t>9/2/2019</a:t>
+              <a:t>9/3/2019</a:t>
             </a:fld>
             <a:endParaRPr lang="en-US"/>
           </a:p>
@@ -1012,7 +1012,7 @@
           <a:p>
             <a:fld id="{B8A70668-5887-4AA1-B337-5A12CCB65D61}" type="datetimeFigureOut">
               <a:rPr lang="en-US" smtClean="0"/>
-              <a:t>9/2/2019</a:t>
+              <a:t>9/3/2019</a:t>
             </a:fld>
             <a:endParaRPr lang="en-US"/>
           </a:p>
@@ -1244,7 +1244,7 @@
           <a:p>
             <a:fld id="{B8A70668-5887-4AA1-B337-5A12CCB65D61}" type="datetimeFigureOut">
               <a:rPr lang="en-US" smtClean="0"/>
-              <a:t>9/2/2019</a:t>
+              <a:t>9/3/2019</a:t>
             </a:fld>
             <a:endParaRPr lang="en-US"/>
           </a:p>
@@ -1611,7 +1611,7 @@
           <a:p>
             <a:fld id="{B8A70668-5887-4AA1-B337-5A12CCB65D61}" type="datetimeFigureOut">
               <a:rPr lang="en-US" smtClean="0"/>
-              <a:t>9/2/2019</a:t>
+              <a:t>9/3/2019</a:t>
             </a:fld>
             <a:endParaRPr lang="en-US"/>
           </a:p>
@@ -1729,7 +1729,7 @@
           <a:p>
             <a:fld id="{B8A70668-5887-4AA1-B337-5A12CCB65D61}" type="datetimeFigureOut">
               <a:rPr lang="en-US" smtClean="0"/>
-              <a:t>9/2/2019</a:t>
+              <a:t>9/3/2019</a:t>
             </a:fld>
             <a:endParaRPr lang="en-US"/>
           </a:p>
@@ -1824,7 +1824,7 @@
           <a:p>
             <a:fld id="{B8A70668-5887-4AA1-B337-5A12CCB65D61}" type="datetimeFigureOut">
               <a:rPr lang="en-US" smtClean="0"/>
-              <a:t>9/2/2019</a:t>
+              <a:t>9/3/2019</a:t>
             </a:fld>
             <a:endParaRPr lang="en-US"/>
           </a:p>
@@ -2101,7 +2101,7 @@
           <a:p>
             <a:fld id="{B8A70668-5887-4AA1-B337-5A12CCB65D61}" type="datetimeFigureOut">
               <a:rPr lang="en-US" smtClean="0"/>
-              <a:t>9/2/2019</a:t>
+              <a:t>9/3/2019</a:t>
             </a:fld>
             <a:endParaRPr lang="en-US"/>
           </a:p>
@@ -2354,7 +2354,7 @@
           <a:p>
             <a:fld id="{B8A70668-5887-4AA1-B337-5A12CCB65D61}" type="datetimeFigureOut">
               <a:rPr lang="en-US" smtClean="0"/>
-              <a:t>9/2/2019</a:t>
+              <a:t>9/3/2019</a:t>
             </a:fld>
             <a:endParaRPr lang="en-US"/>
           </a:p>
@@ -2567,7 +2567,7 @@
           <a:p>
             <a:fld id="{B8A70668-5887-4AA1-B337-5A12CCB65D61}" type="datetimeFigureOut">
               <a:rPr lang="en-US" smtClean="0"/>
-              <a:t>9/2/2019</a:t>
+              <a:t>9/3/2019</a:t>
             </a:fld>
             <a:endParaRPr lang="en-US"/>
           </a:p>
@@ -3004,7 +3004,7 @@
               <a:rPr lang="en-US" sz="2800" b="1" dirty="0" smtClean="0">
                 <a:latin typeface="+mn-lt"/>
               </a:rPr>
-              <a:t>Crime Comparisons and Trends before and after Marijuana Legalization</a:t>
+              <a:t>Crime Changing and Trends before and after Marijuana Legalization in the Medical-only Counties</a:t>
             </a:r>
             <a:endParaRPr lang="en-US" sz="2800" b="1" dirty="0">
               <a:latin typeface="+mn-lt"/>
@@ -3105,8 +3105,32 @@
                 </a:solidFill>
                 <a:cs typeface="Courier New" panose="02070309020205020404" pitchFamily="49" charset="0"/>
               </a:rPr>
-              <a:t>'Arson' 'Burglary' 'Larceny/Theft' 'Motor Vehicle Theft'</a:t>
-            </a:r>
+              <a:t>Arson, Burglary, Larceny/Theft, Motor </a:t>
+            </a:r>
+            <a:r>
+              <a:rPr lang="en-US" altLang="en-US" sz="2000" dirty="0" smtClean="0">
+                <a:solidFill>
+                  <a:srgbClr val="000000"/>
+                </a:solidFill>
+                <a:cs typeface="Courier New" panose="02070309020205020404" pitchFamily="49" charset="0"/>
+              </a:rPr>
+              <a:t>Vehicle </a:t>
+            </a:r>
+            <a:r>
+              <a:rPr lang="en-US" altLang="en-US" sz="2000" dirty="0" smtClean="0">
+                <a:solidFill>
+                  <a:srgbClr val="000000"/>
+                </a:solidFill>
+                <a:cs typeface="Courier New" panose="02070309020205020404" pitchFamily="49" charset="0"/>
+              </a:rPr>
+              <a:t>Theft</a:t>
+            </a:r>
+            <a:endParaRPr lang="en-US" altLang="en-US" sz="2000" dirty="0" smtClean="0">
+              <a:solidFill>
+                <a:srgbClr val="000000"/>
+              </a:solidFill>
+              <a:cs typeface="Courier New" panose="02070309020205020404" pitchFamily="49" charset="0"/>
+            </a:endParaRPr>
           </a:p>
           <a:p>
             <a:pPr algn="l"/>
@@ -3124,13 +3148,31 @@
               <a:t>Violent –  </a:t>
             </a:r>
             <a:r>
-              <a:rPr lang="en-US" altLang="en-US" sz="2000" dirty="0">
+              <a:rPr lang="en-US" altLang="en-US" sz="2000" dirty="0" smtClean="0">
                 <a:solidFill>
                   <a:srgbClr val="000000"/>
                 </a:solidFill>
                 <a:cs typeface="Courier New" panose="02070309020205020404" pitchFamily="49" charset="0"/>
               </a:rPr>
-              <a:t>'Aggravated Assault' 'Forcible rape' 'Murder/Manslaughter' 'Robbery'</a:t>
+              <a:t>Aggravated Assault, Forcible rape, Murder/Manslaughter</a:t>
+            </a:r>
+            <a:r>
+              <a:rPr lang="en-US" altLang="en-US" sz="2000" dirty="0" smtClean="0">
+                <a:solidFill>
+                  <a:srgbClr val="000000"/>
+                </a:solidFill>
+                <a:cs typeface="Courier New" panose="02070309020205020404" pitchFamily="49" charset="0"/>
+              </a:rPr>
+              <a:t>, and </a:t>
+            </a:r>
+            <a:r>
+              <a:rPr lang="en-US" altLang="en-US" sz="2000" dirty="0" smtClean="0">
+                <a:solidFill>
+                  <a:srgbClr val="000000"/>
+                </a:solidFill>
+                <a:cs typeface="Courier New" panose="02070309020205020404" pitchFamily="49" charset="0"/>
+              </a:rPr>
+              <a:t>Robbery</a:t>
             </a:r>
             <a:r>
               <a:rPr kumimoji="0" lang="en-US" altLang="en-US" sz="2000" i="0" u="none" strike="noStrike" cap="none" normalizeH="0" baseline="0" dirty="0" smtClean="0">
@@ -3144,6 +3186,15 @@
               </a:rPr>
               <a:t> </a:t>
             </a:r>
+            <a:endParaRPr kumimoji="0" lang="en-US" altLang="en-US" sz="2000" i="0" u="none" strike="noStrike" cap="none" normalizeH="0" baseline="0" dirty="0" smtClean="0">
+              <a:ln>
+                <a:noFill/>
+              </a:ln>
+              <a:solidFill>
+                <a:schemeClr val="tx1"/>
+              </a:solidFill>
+              <a:effectLst/>
+            </a:endParaRPr>
           </a:p>
           <a:p>
             <a:pPr algn="l"/>
@@ -3156,13 +3207,13 @@
               <a:t>Drug –  </a:t>
             </a:r>
             <a:r>
-              <a:rPr lang="en-US" altLang="en-US" sz="2000" dirty="0">
+              <a:rPr lang="en-US" altLang="en-US" sz="2000" dirty="0" smtClean="0">
                 <a:solidFill>
                   <a:srgbClr val="000000"/>
                 </a:solidFill>
                 <a:cs typeface="Courier New" panose="02070309020205020404" pitchFamily="49" charset="0"/>
               </a:rPr>
-              <a:t>'Drug Violations'</a:t>
+              <a:t>Drug Violations</a:t>
             </a:r>
             <a:r>
               <a:rPr kumimoji="0" lang="en-US" altLang="en-US" sz="2000" i="0" u="none" strike="noStrike" cap="none" normalizeH="0" baseline="0" dirty="0" smtClean="0">
@@ -3176,6 +3227,15 @@
               </a:rPr>
               <a:t> </a:t>
             </a:r>
+            <a:endParaRPr kumimoji="0" lang="en-US" altLang="en-US" sz="2000" i="0" u="none" strike="noStrike" cap="none" normalizeH="0" baseline="0" dirty="0" smtClean="0">
+              <a:ln>
+                <a:noFill/>
+              </a:ln>
+              <a:solidFill>
+                <a:schemeClr val="tx1"/>
+              </a:solidFill>
+              <a:effectLst/>
+            </a:endParaRPr>
           </a:p>
           <a:p>
             <a:pPr algn="l"/>
@@ -3498,7 +3558,19 @@
             </a:r>
             <a:r>
               <a:rPr lang="en-US" dirty="0" smtClean="0"/>
-              <a:t>out as a result of reducing the property crimes in the El Paso and Teller counties.</a:t>
+              <a:t>out as a result of </a:t>
+            </a:r>
+            <a:r>
+              <a:rPr lang="en-US" dirty="0" smtClean="0"/>
+              <a:t>dropp</a:t>
+            </a:r>
+            <a:r>
+              <a:rPr lang="en-US" dirty="0" smtClean="0"/>
+              <a:t>ing </a:t>
+            </a:r>
+            <a:r>
+              <a:rPr lang="en-US" dirty="0" smtClean="0"/>
+              <a:t>the property crimes in the El Paso and Teller counties.</a:t>
             </a:r>
             <a:endParaRPr lang="en-US" dirty="0"/>
           </a:p>
@@ -3829,23 +3901,47 @@
             </a:r>
             <a:r>
               <a:rPr lang="en-US" dirty="0" smtClean="0"/>
-              <a:t> prediction shows the drug crimes will </a:t>
+              <a:t> prediction shows the drug crimes will be </a:t>
             </a:r>
             <a:r>
               <a:rPr lang="en-US" dirty="0" smtClean="0"/>
-              <a:t>be slowing </a:t>
+              <a:t>slowly </a:t>
             </a:r>
             <a:r>
               <a:rPr lang="en-US" dirty="0" smtClean="0"/>
-              <a:t>going down.  It may be because marijuana legalization </a:t>
+              <a:t>going down.  It may be because </a:t>
             </a:r>
             <a:r>
               <a:rPr lang="en-US" dirty="0" smtClean="0"/>
-              <a:t>is driving </a:t>
+              <a:t>the medical-only marijuana </a:t>
             </a:r>
             <a:r>
               <a:rPr lang="en-US" dirty="0" smtClean="0"/>
-              <a:t>people to buy recreational marijuana in other counties without violating the law in the El Paso and Teller counties.</a:t>
+              <a:t>legalization </a:t>
+            </a:r>
+            <a:r>
+              <a:rPr lang="en-US" dirty="0" smtClean="0"/>
+              <a:t>pushes people </a:t>
+            </a:r>
+            <a:r>
+              <a:rPr lang="en-US" dirty="0" smtClean="0"/>
+              <a:t>to buy recreational marijuana in other </a:t>
+            </a:r>
+            <a:r>
+              <a:rPr lang="en-US" dirty="0" smtClean="0"/>
+              <a:t>counties, which causes </a:t>
+            </a:r>
+            <a:r>
+              <a:rPr lang="en-US" smtClean="0"/>
+              <a:t>drug violation to decrease </a:t>
+            </a:r>
+            <a:r>
+              <a:rPr lang="en-US" dirty="0" smtClean="0"/>
+              <a:t>in </a:t>
+            </a:r>
+            <a:r>
+              <a:rPr lang="en-US" dirty="0" smtClean="0"/>
+              <a:t>the El Paso and Teller counties.</a:t>
             </a:r>
             <a:endParaRPr lang="en-US" dirty="0"/>
           </a:p>

</xml_diff>